<commit_message>
added Azure DB for MySQL icon in the Achitecture diagram
</commit_message>
<xml_diff>
--- a/docs/microservices-architecture-diagram.pptx
+++ b/docs/microservices-architecture-diagram.pptx
@@ -5,10 +5,11 @@
     <p:sldMasterId id="2147483660" r:id="rId1"/>
   </p:sldMasterIdLst>
   <p:notesMasterIdLst>
-    <p:notesMasterId r:id="rId3"/>
+    <p:notesMasterId r:id="rId4"/>
   </p:notesMasterIdLst>
   <p:sldIdLst>
     <p:sldId id="2141411456" r:id="rId2"/>
+    <p:sldId id="2141411457" r:id="rId3"/>
   </p:sldIdLst>
   <p:sldSz cx="12192000" cy="6858000"/>
   <p:notesSz cx="6858000" cy="9144000"/>
@@ -107,6 +108,11 @@
       </a:defRPr>
     </a:lvl9pPr>
   </p:defaultTextStyle>
+  <p:extLst>
+    <p:ext uri="{EFAFB233-063F-42B5-8137-9DF3F51BA10A}">
+      <p15:sldGuideLst xmlns:p15="http://schemas.microsoft.com/office/powerpoint/2012/main"/>
+    </p:ext>
+  </p:extLst>
 </p:presentation>
 </file>
 
@@ -192,7 +198,7 @@
           <a:p>
             <a:fld id="{E6E83A38-4D4E-460E-A605-BC2E421C1155}" type="datetimeFigureOut">
               <a:rPr lang="fr-FR" smtClean="0"/>
-              <a:t>16/02/2022</a:t>
+              <a:t>01/03/2022</a:t>
             </a:fld>
             <a:endParaRPr lang="fr-FR"/>
           </a:p>
@@ -726,6 +732,281 @@
     <p:extLst>
       <p:ext uri="{BB962C8B-B14F-4D97-AF65-F5344CB8AC3E}">
         <p14:creationId xmlns:p14="http://schemas.microsoft.com/office/powerpoint/2010/main" val="2817460685"/>
+      </p:ext>
+    </p:extLst>
+  </p:cSld>
+  <p:clrMapOvr>
+    <a:masterClrMapping/>
+  </p:clrMapOvr>
+</p:notes>
+</file>
+
+<file path=ppt/notesSlides/notesSlide2.xml><?xml version="1.0" encoding="utf-8"?>
+<p:notes xmlns:a="http://schemas.openxmlformats.org/drawingml/2006/main" xmlns:r="http://schemas.openxmlformats.org/officeDocument/2006/relationships" xmlns:p="http://schemas.openxmlformats.org/presentationml/2006/main">
+  <p:cSld>
+    <p:spTree>
+      <p:nvGrpSpPr>
+        <p:cNvPr id="1" name=""/>
+        <p:cNvGrpSpPr/>
+        <p:nvPr/>
+      </p:nvGrpSpPr>
+      <p:grpSpPr>
+        <a:xfrm>
+          <a:off x="0" y="0"/>
+          <a:ext cx="0" cy="0"/>
+          <a:chOff x="0" y="0"/>
+          <a:chExt cx="0" cy="0"/>
+        </a:xfrm>
+      </p:grpSpPr>
+      <p:sp>
+        <p:nvSpPr>
+          <p:cNvPr id="2" name="Slide Image Placeholder 1"/>
+          <p:cNvSpPr>
+            <a:spLocks noGrp="1" noRot="1" noChangeAspect="1"/>
+          </p:cNvSpPr>
+          <p:nvPr>
+            <p:ph type="sldImg"/>
+          </p:nvPr>
+        </p:nvSpPr>
+        <p:spPr/>
+      </p:sp>
+      <p:sp>
+        <p:nvSpPr>
+          <p:cNvPr id="3" name="Notes Placeholder 2"/>
+          <p:cNvSpPr>
+            <a:spLocks noGrp="1"/>
+          </p:cNvSpPr>
+          <p:nvPr>
+            <p:ph type="body" idx="1"/>
+          </p:nvPr>
+        </p:nvSpPr>
+        <p:spPr/>
+        <p:txBody>
+          <a:bodyPr/>
+          <a:lstStyle/>
+          <a:p>
+            <a:endParaRPr lang="fr-FR" dirty="0"/>
+          </a:p>
+        </p:txBody>
+      </p:sp>
+      <p:sp>
+        <p:nvSpPr>
+          <p:cNvPr id="4" name="Header Placeholder 3"/>
+          <p:cNvSpPr>
+            <a:spLocks noGrp="1"/>
+          </p:cNvSpPr>
+          <p:nvPr>
+            <p:ph type="hdr" sz="quarter"/>
+          </p:nvPr>
+        </p:nvSpPr>
+        <p:spPr/>
+        <p:txBody>
+          <a:bodyPr/>
+          <a:lstStyle/>
+          <a:p>
+            <a:pPr marL="0" marR="0" lvl="0" indent="0" algn="l" defTabSz="932742" rtl="0" eaLnBrk="1" fontAlgn="auto" latinLnBrk="0" hangingPunct="1">
+              <a:lnSpc>
+                <a:spcPct val="100000"/>
+              </a:lnSpc>
+              <a:spcBef>
+                <a:spcPts val="0"/>
+              </a:spcBef>
+              <a:spcAft>
+                <a:spcPts val="0"/>
+              </a:spcAft>
+              <a:buClrTx/>
+              <a:buSzTx/>
+              <a:buFontTx/>
+              <a:buNone/>
+              <a:tabLst/>
+              <a:defRPr/>
+            </a:pPr>
+            <a:endParaRPr kumimoji="0" lang="en-US" sz="1200" b="0" i="0" u="none" strike="noStrike" kern="1200" cap="none" spc="0" normalizeH="0" baseline="0" noProof="0" dirty="0">
+              <a:ln>
+                <a:noFill/>
+              </a:ln>
+              <a:solidFill>
+                <a:prstClr val="black"/>
+              </a:solidFill>
+              <a:effectLst/>
+              <a:uLnTx/>
+              <a:uFillTx/>
+              <a:latin typeface="Segoe UI" pitchFamily="34" charset="0"/>
+              <a:ea typeface="+mn-ea"/>
+              <a:cs typeface="+mn-cs"/>
+            </a:endParaRPr>
+          </a:p>
+        </p:txBody>
+      </p:sp>
+      <p:sp>
+        <p:nvSpPr>
+          <p:cNvPr id="5" name="Footer Placeholder 4"/>
+          <p:cNvSpPr>
+            <a:spLocks noGrp="1"/>
+          </p:cNvSpPr>
+          <p:nvPr>
+            <p:ph type="ftr" sz="quarter" idx="4"/>
+          </p:nvPr>
+        </p:nvSpPr>
+        <p:spPr/>
+        <p:txBody>
+          <a:bodyPr/>
+          <a:lstStyle/>
+          <a:p>
+            <a:pPr marL="571500" marR="0" lvl="0" indent="0" algn="l" defTabSz="914099" rtl="0" eaLnBrk="0" fontAlgn="auto" latinLnBrk="0" hangingPunct="0">
+              <a:lnSpc>
+                <a:spcPct val="100000"/>
+              </a:lnSpc>
+              <a:spcBef>
+                <a:spcPts val="0"/>
+              </a:spcBef>
+              <a:spcAft>
+                <a:spcPts val="0"/>
+              </a:spcAft>
+              <a:buClrTx/>
+              <a:buSzTx/>
+              <a:buFontTx/>
+              <a:buNone/>
+              <a:tabLst/>
+              <a:defRPr/>
+            </a:pPr>
+            <a:r>
+              <a:rPr kumimoji="0" lang="en-US" sz="400" b="0" i="0" u="none" strike="noStrike" kern="1200" cap="none" spc="0" normalizeH="0" baseline="0" noProof="0">
+                <a:ln>
+                  <a:noFill/>
+                </a:ln>
+                <a:gradFill>
+                  <a:gsLst>
+                    <a:gs pos="0">
+                      <a:prstClr val="black"/>
+                    </a:gs>
+                    <a:gs pos="100000">
+                      <a:prstClr val="black"/>
+                    </a:gs>
+                  </a:gsLst>
+                  <a:lin ang="5400000" scaled="0"/>
+                </a:gradFill>
+                <a:effectLst/>
+                <a:uLnTx/>
+                <a:uFillTx/>
+                <a:latin typeface="Segoe UI" pitchFamily="34" charset="0"/>
+                <a:ea typeface="Segoe UI" pitchFamily="34" charset="0"/>
+                <a:cs typeface="Segoe UI" pitchFamily="34" charset="0"/>
+              </a:rPr>
+              <a:t>© Microsoft Corporation</a:t>
+            </a:r>
+            <a:endParaRPr kumimoji="0" lang="en-US" sz="400" b="0" i="0" u="none" strike="noStrike" kern="1200" cap="none" spc="0" normalizeH="0" baseline="0" noProof="0" dirty="0">
+              <a:ln>
+                <a:noFill/>
+              </a:ln>
+              <a:gradFill>
+                <a:gsLst>
+                  <a:gs pos="0">
+                    <a:prstClr val="black"/>
+                  </a:gs>
+                  <a:gs pos="100000">
+                    <a:prstClr val="black"/>
+                  </a:gs>
+                </a:gsLst>
+                <a:lin ang="5400000" scaled="0"/>
+              </a:gradFill>
+              <a:effectLst/>
+              <a:uLnTx/>
+              <a:uFillTx/>
+              <a:latin typeface="Segoe UI" pitchFamily="34" charset="0"/>
+              <a:ea typeface="Segoe UI" pitchFamily="34" charset="0"/>
+              <a:cs typeface="Segoe UI" pitchFamily="34" charset="0"/>
+            </a:endParaRPr>
+          </a:p>
+        </p:txBody>
+      </p:sp>
+      <p:sp>
+        <p:nvSpPr>
+          <p:cNvPr id="6" name="Slide Number Placeholder 5"/>
+          <p:cNvSpPr>
+            <a:spLocks noGrp="1"/>
+          </p:cNvSpPr>
+          <p:nvPr>
+            <p:ph type="sldNum" sz="quarter" idx="5"/>
+          </p:nvPr>
+        </p:nvSpPr>
+        <p:spPr/>
+        <p:txBody>
+          <a:bodyPr/>
+          <a:lstStyle/>
+          <a:p>
+            <a:pPr marL="0" marR="0" lvl="0" indent="0" algn="r" defTabSz="932742" rtl="0" eaLnBrk="1" fontAlgn="auto" latinLnBrk="0" hangingPunct="1">
+              <a:lnSpc>
+                <a:spcPct val="100000"/>
+              </a:lnSpc>
+              <a:spcBef>
+                <a:spcPts val="0"/>
+              </a:spcBef>
+              <a:spcAft>
+                <a:spcPts val="0"/>
+              </a:spcAft>
+              <a:buClrTx/>
+              <a:buSzTx/>
+              <a:buFontTx/>
+              <a:buNone/>
+              <a:tabLst/>
+              <a:defRPr/>
+            </a:pPr>
+            <a:fld id="{B4008EB6-D09E-4580-8CD6-DDB14511944F}" type="slidenum">
+              <a:rPr kumimoji="0" lang="en-US" sz="1200" b="0" i="0" u="none" strike="noStrike" kern="1200" cap="none" spc="0" normalizeH="0" baseline="0" noProof="0" smtClean="0">
+                <a:ln>
+                  <a:noFill/>
+                </a:ln>
+                <a:solidFill>
+                  <a:prstClr val="black"/>
+                </a:solidFill>
+                <a:effectLst/>
+                <a:uLnTx/>
+                <a:uFillTx/>
+                <a:latin typeface="Segoe UI" pitchFamily="34" charset="0"/>
+                <a:ea typeface="+mn-ea"/>
+                <a:cs typeface="+mn-cs"/>
+              </a:rPr>
+              <a:pPr marL="0" marR="0" lvl="0" indent="0" algn="r" defTabSz="932742" rtl="0" eaLnBrk="1" fontAlgn="auto" latinLnBrk="0" hangingPunct="1">
+                <a:lnSpc>
+                  <a:spcPct val="100000"/>
+                </a:lnSpc>
+                <a:spcBef>
+                  <a:spcPts val="0"/>
+                </a:spcBef>
+                <a:spcAft>
+                  <a:spcPts val="0"/>
+                </a:spcAft>
+                <a:buClrTx/>
+                <a:buSzTx/>
+                <a:buFontTx/>
+                <a:buNone/>
+                <a:tabLst/>
+                <a:defRPr/>
+              </a:pPr>
+              <a:t>2</a:t>
+            </a:fld>
+            <a:endParaRPr kumimoji="0" lang="en-US" sz="1200" b="0" i="0" u="none" strike="noStrike" kern="1200" cap="none" spc="0" normalizeH="0" baseline="0" noProof="0" dirty="0">
+              <a:ln>
+                <a:noFill/>
+              </a:ln>
+              <a:solidFill>
+                <a:prstClr val="black"/>
+              </a:solidFill>
+              <a:effectLst/>
+              <a:uLnTx/>
+              <a:uFillTx/>
+              <a:latin typeface="Segoe UI" pitchFamily="34" charset="0"/>
+              <a:ea typeface="+mn-ea"/>
+              <a:cs typeface="+mn-cs"/>
+            </a:endParaRPr>
+          </a:p>
+        </p:txBody>
+      </p:sp>
+    </p:spTree>
+    <p:extLst>
+      <p:ext uri="{BB962C8B-B14F-4D97-AF65-F5344CB8AC3E}">
+        <p14:creationId xmlns:p14="http://schemas.microsoft.com/office/powerpoint/2010/main" val="2235363294"/>
       </p:ext>
     </p:extLst>
   </p:cSld>
@@ -17886,6 +18167,1297 @@
       </p:grpSpPr>
       <p:sp>
         <p:nvSpPr>
+          <p:cNvPr id="14" name="Rectangle 13">
+            <a:extLst>
+              <a:ext uri="{FF2B5EF4-FFF2-40B4-BE49-F238E27FC236}">
+                <a16:creationId xmlns:a16="http://schemas.microsoft.com/office/drawing/2014/main" id="{F06E5AC1-B7D6-403C-861C-7563BEAF3555}"/>
+              </a:ext>
+            </a:extLst>
+          </p:cNvPr>
+          <p:cNvSpPr/>
+          <p:nvPr/>
+        </p:nvSpPr>
+        <p:spPr>
+          <a:xfrm>
+            <a:off x="1375038" y="0"/>
+            <a:ext cx="9419007" cy="6675807"/>
+          </a:xfrm>
+          <a:prstGeom prst="rect">
+            <a:avLst/>
+          </a:prstGeom>
+          <a:solidFill>
+            <a:schemeClr val="bg1"/>
+          </a:solidFill>
+          <a:ln w="6350" cap="flat" cmpd="sng" algn="ctr">
+            <a:noFill/>
+            <a:prstDash val="solid"/>
+            <a:miter lim="800000"/>
+          </a:ln>
+          <a:effectLst/>
+        </p:spPr>
+        <p:style>
+          <a:lnRef idx="0">
+            <a:scrgbClr r="0" g="0" b="0"/>
+          </a:lnRef>
+          <a:fillRef idx="0">
+            <a:scrgbClr r="0" g="0" b="0"/>
+          </a:fillRef>
+          <a:effectRef idx="0">
+            <a:scrgbClr r="0" g="0" b="0"/>
+          </a:effectRef>
+          <a:fontRef idx="major"/>
+        </p:style>
+        <p:txBody>
+          <a:bodyPr lIns="134464" tIns="134464" rtlCol="0" anchor="t" anchorCtr="0"/>
+          <a:lstStyle/>
+          <a:p>
+            <a:pPr algn="ctr" defTabSz="896386">
+              <a:defRPr/>
+            </a:pPr>
+            <a:endParaRPr lang="en-US" sz="1765" kern="0" dirty="0">
+              <a:solidFill>
+                <a:srgbClr val="FFFFFF"/>
+              </a:solidFill>
+              <a:latin typeface="Segoe UI"/>
+            </a:endParaRPr>
+          </a:p>
+        </p:txBody>
+      </p:sp>
+      <p:sp>
+        <p:nvSpPr>
+          <p:cNvPr id="147" name="Rectangle 146">
+            <a:extLst>
+              <a:ext uri="{FF2B5EF4-FFF2-40B4-BE49-F238E27FC236}">
+                <a16:creationId xmlns:a16="http://schemas.microsoft.com/office/drawing/2014/main" id="{7979A319-3D25-45DD-9159-78C4A59103B7}"/>
+              </a:ext>
+            </a:extLst>
+          </p:cNvPr>
+          <p:cNvSpPr/>
+          <p:nvPr/>
+        </p:nvSpPr>
+        <p:spPr>
+          <a:xfrm>
+            <a:off x="4981316" y="2663477"/>
+            <a:ext cx="2229365" cy="776431"/>
+          </a:xfrm>
+          <a:prstGeom prst="rect">
+            <a:avLst/>
+          </a:prstGeom>
+          <a:solidFill>
+            <a:srgbClr val="4DB0FF"/>
+          </a:solidFill>
+          <a:ln w="6350" cap="flat" cmpd="sng" algn="ctr">
+            <a:noFill/>
+            <a:prstDash val="solid"/>
+            <a:miter lim="800000"/>
+          </a:ln>
+          <a:effectLst/>
+        </p:spPr>
+        <p:style>
+          <a:lnRef idx="0">
+            <a:scrgbClr r="0" g="0" b="0"/>
+          </a:lnRef>
+          <a:fillRef idx="0">
+            <a:scrgbClr r="0" g="0" b="0"/>
+          </a:fillRef>
+          <a:effectRef idx="0">
+            <a:scrgbClr r="0" g="0" b="0"/>
+          </a:effectRef>
+          <a:fontRef idx="major"/>
+        </p:style>
+        <p:txBody>
+          <a:bodyPr lIns="134464" tIns="134464" rtlCol="0" anchor="t" anchorCtr="0"/>
+          <a:lstStyle/>
+          <a:p>
+            <a:pPr algn="ctr" defTabSz="896386">
+              <a:defRPr/>
+            </a:pPr>
+            <a:r>
+              <a:rPr lang="en-US" sz="1765" b="1" kern="0" dirty="0">
+                <a:solidFill>
+                  <a:srgbClr val="FFFFFF"/>
+                </a:solidFill>
+                <a:latin typeface="Segoe UI"/>
+              </a:rPr>
+              <a:t>UI + API Gateway</a:t>
+            </a:r>
+            <a:endParaRPr lang="en-US" sz="1765" kern="0" dirty="0">
+              <a:solidFill>
+                <a:srgbClr val="FFFFFF"/>
+              </a:solidFill>
+              <a:latin typeface="Segoe UI"/>
+            </a:endParaRPr>
+          </a:p>
+        </p:txBody>
+      </p:sp>
+      <p:cxnSp>
+        <p:nvCxnSpPr>
+          <p:cNvPr id="29" name="Google Shape;1220;p51">
+            <a:extLst>
+              <a:ext uri="{FF2B5EF4-FFF2-40B4-BE49-F238E27FC236}">
+                <a16:creationId xmlns:a16="http://schemas.microsoft.com/office/drawing/2014/main" id="{3649319D-B3E6-4E93-AB23-9EB371B5FA96}"/>
+              </a:ext>
+            </a:extLst>
+          </p:cNvPr>
+          <p:cNvCxnSpPr>
+            <a:cxnSpLocks/>
+            <a:stCxn id="147" idx="2"/>
+            <a:endCxn id="20" idx="0"/>
+          </p:cNvCxnSpPr>
+          <p:nvPr/>
+        </p:nvCxnSpPr>
+        <p:spPr>
+          <a:xfrm>
+            <a:off x="6095999" y="3439908"/>
+            <a:ext cx="0" cy="1249419"/>
+          </a:xfrm>
+          <a:prstGeom prst="straightConnector1">
+            <a:avLst/>
+          </a:prstGeom>
+          <a:noFill/>
+          <a:ln w="38100" cap="flat" cmpd="sng">
+            <a:solidFill>
+              <a:srgbClr val="00B050"/>
+            </a:solidFill>
+            <a:prstDash val="solid"/>
+            <a:round/>
+            <a:headEnd type="none" w="sm" len="sm"/>
+            <a:tailEnd type="triangle" w="sm" len="sm"/>
+          </a:ln>
+        </p:spPr>
+      </p:cxnSp>
+      <p:sp>
+        <p:nvSpPr>
+          <p:cNvPr id="43" name="Google Shape;134;p16">
+            <a:extLst>
+              <a:ext uri="{FF2B5EF4-FFF2-40B4-BE49-F238E27FC236}">
+                <a16:creationId xmlns:a16="http://schemas.microsoft.com/office/drawing/2014/main" id="{2FCD2BC3-E3B0-4EED-BF6D-7366EC442C42}"/>
+              </a:ext>
+            </a:extLst>
+          </p:cNvPr>
+          <p:cNvSpPr txBox="1"/>
+          <p:nvPr/>
+        </p:nvSpPr>
+        <p:spPr>
+          <a:xfrm>
+            <a:off x="6258168" y="493424"/>
+            <a:ext cx="1025728" cy="296008"/>
+          </a:xfrm>
+          <a:prstGeom prst="rect">
+            <a:avLst/>
+          </a:prstGeom>
+          <a:noFill/>
+          <a:ln>
+            <a:noFill/>
+          </a:ln>
+        </p:spPr>
+        <p:txBody>
+          <a:bodyPr spcFirstLastPara="1" wrap="square" lIns="89628" tIns="44802" rIns="89628" bIns="44802" anchor="ctr" anchorCtr="0">
+            <a:noAutofit/>
+          </a:bodyPr>
+          <a:lstStyle/>
+          <a:p>
+            <a:pPr algn="ctr" defTabSz="914367">
+              <a:buClr>
+                <a:srgbClr val="000000"/>
+              </a:buClr>
+              <a:buSzPts val="800"/>
+            </a:pPr>
+            <a:r>
+              <a:rPr lang="en-GB" sz="1200" dirty="0">
+                <a:solidFill>
+                  <a:srgbClr val="000000"/>
+                </a:solidFill>
+                <a:latin typeface="Segoe UI"/>
+              </a:rPr>
+              <a:t>End-User</a:t>
+            </a:r>
+            <a:endParaRPr sz="1200" dirty="0">
+              <a:solidFill>
+                <a:srgbClr val="000000"/>
+              </a:solidFill>
+              <a:latin typeface="Segoe UI"/>
+            </a:endParaRPr>
+          </a:p>
+        </p:txBody>
+      </p:sp>
+      <p:pic>
+        <p:nvPicPr>
+          <p:cNvPr id="54" name="Google Shape;578;p58">
+            <a:extLst>
+              <a:ext uri="{FF2B5EF4-FFF2-40B4-BE49-F238E27FC236}">
+                <a16:creationId xmlns:a16="http://schemas.microsoft.com/office/drawing/2014/main" id="{344DEA19-BA1E-4635-B5D1-0FF0CD233EEE}"/>
+              </a:ext>
+            </a:extLst>
+          </p:cNvPr>
+          <p:cNvPicPr>
+            <a:picLocks noChangeAspect="1"/>
+          </p:cNvPicPr>
+          <p:nvPr/>
+        </p:nvPicPr>
+        <p:blipFill>
+          <a:blip r:embed="rId3">
+            <a:lum/>
+            <a:alphaModFix/>
+          </a:blip>
+          <a:srcRect/>
+          <a:stretch>
+            <a:fillRect/>
+          </a:stretch>
+        </p:blipFill>
+        <p:spPr>
+          <a:xfrm>
+            <a:off x="5914371" y="492842"/>
+            <a:ext cx="361745" cy="289397"/>
+          </a:xfrm>
+          <a:prstGeom prst="rect">
+            <a:avLst/>
+          </a:prstGeom>
+          <a:noFill/>
+          <a:ln>
+            <a:noFill/>
+          </a:ln>
+        </p:spPr>
+      </p:pic>
+      <p:pic>
+        <p:nvPicPr>
+          <p:cNvPr id="1027" name="Picture 1026">
+            <a:extLst>
+              <a:ext uri="{FF2B5EF4-FFF2-40B4-BE49-F238E27FC236}">
+                <a16:creationId xmlns:a16="http://schemas.microsoft.com/office/drawing/2014/main" id="{DFCB5645-2870-4053-A7AD-6A44CBC453EB}"/>
+              </a:ext>
+            </a:extLst>
+          </p:cNvPr>
+          <p:cNvPicPr>
+            <a:picLocks noChangeAspect="1"/>
+          </p:cNvPicPr>
+          <p:nvPr/>
+        </p:nvPicPr>
+        <p:blipFill>
+          <a:blip r:embed="rId4"/>
+          <a:stretch>
+            <a:fillRect/>
+          </a:stretch>
+        </p:blipFill>
+        <p:spPr>
+          <a:xfrm>
+            <a:off x="5923949" y="914165"/>
+            <a:ext cx="352923" cy="352923"/>
+          </a:xfrm>
+          <a:prstGeom prst="rect">
+            <a:avLst/>
+          </a:prstGeom>
+        </p:spPr>
+      </p:pic>
+      <p:sp>
+        <p:nvSpPr>
+          <p:cNvPr id="17" name="Google Shape;134;p16">
+            <a:extLst>
+              <a:ext uri="{FF2B5EF4-FFF2-40B4-BE49-F238E27FC236}">
+                <a16:creationId xmlns:a16="http://schemas.microsoft.com/office/drawing/2014/main" id="{9D5201F3-2723-4343-A542-CAE9AD597B1E}"/>
+              </a:ext>
+            </a:extLst>
+          </p:cNvPr>
+          <p:cNvSpPr txBox="1"/>
+          <p:nvPr/>
+        </p:nvSpPr>
+        <p:spPr>
+          <a:xfrm>
+            <a:off x="6235922" y="940814"/>
+            <a:ext cx="1025728" cy="296008"/>
+          </a:xfrm>
+          <a:prstGeom prst="rect">
+            <a:avLst/>
+          </a:prstGeom>
+          <a:noFill/>
+          <a:ln>
+            <a:noFill/>
+          </a:ln>
+        </p:spPr>
+        <p:txBody>
+          <a:bodyPr spcFirstLastPara="1" wrap="square" lIns="89628" tIns="44802" rIns="89628" bIns="44802" anchor="ctr" anchorCtr="0">
+            <a:noAutofit/>
+          </a:bodyPr>
+          <a:lstStyle/>
+          <a:p>
+            <a:pPr algn="ctr" defTabSz="914367">
+              <a:buClr>
+                <a:srgbClr val="000000"/>
+              </a:buClr>
+              <a:buSzPts val="800"/>
+            </a:pPr>
+            <a:r>
+              <a:rPr lang="en-GB" sz="1200" dirty="0">
+                <a:solidFill>
+                  <a:srgbClr val="000000"/>
+                </a:solidFill>
+                <a:latin typeface="Segoe UI"/>
+              </a:rPr>
+              <a:t>Browser</a:t>
+            </a:r>
+            <a:endParaRPr sz="1200" dirty="0">
+              <a:solidFill>
+                <a:srgbClr val="000000"/>
+              </a:solidFill>
+              <a:latin typeface="Segoe UI"/>
+            </a:endParaRPr>
+          </a:p>
+        </p:txBody>
+      </p:sp>
+      <p:sp>
+        <p:nvSpPr>
+          <p:cNvPr id="20" name="Rectangle 19">
+            <a:extLst>
+              <a:ext uri="{FF2B5EF4-FFF2-40B4-BE49-F238E27FC236}">
+                <a16:creationId xmlns:a16="http://schemas.microsoft.com/office/drawing/2014/main" id="{91F57730-76C7-455C-9469-3903A5FA3638}"/>
+              </a:ext>
+            </a:extLst>
+          </p:cNvPr>
+          <p:cNvSpPr/>
+          <p:nvPr/>
+        </p:nvSpPr>
+        <p:spPr>
+          <a:xfrm>
+            <a:off x="4981316" y="4689327"/>
+            <a:ext cx="2229365" cy="776431"/>
+          </a:xfrm>
+          <a:prstGeom prst="rect">
+            <a:avLst/>
+          </a:prstGeom>
+          <a:solidFill>
+            <a:srgbClr val="4DB0FF"/>
+          </a:solidFill>
+          <a:ln w="6350" cap="flat" cmpd="sng" algn="ctr">
+            <a:noFill/>
+            <a:prstDash val="solid"/>
+            <a:miter lim="800000"/>
+          </a:ln>
+          <a:effectLst/>
+        </p:spPr>
+        <p:style>
+          <a:lnRef idx="0">
+            <a:scrgbClr r="0" g="0" b="0"/>
+          </a:lnRef>
+          <a:fillRef idx="0">
+            <a:scrgbClr r="0" g="0" b="0"/>
+          </a:fillRef>
+          <a:effectRef idx="0">
+            <a:scrgbClr r="0" g="0" b="0"/>
+          </a:effectRef>
+          <a:fontRef idx="major"/>
+        </p:style>
+        <p:txBody>
+          <a:bodyPr lIns="134464" tIns="134464" rtlCol="0" anchor="t" anchorCtr="0"/>
+          <a:lstStyle/>
+          <a:p>
+            <a:pPr algn="ctr" defTabSz="896386">
+              <a:defRPr/>
+            </a:pPr>
+            <a:r>
+              <a:rPr lang="en-US" sz="1765" b="1" kern="0" dirty="0">
+                <a:solidFill>
+                  <a:srgbClr val="FFFFFF"/>
+                </a:solidFill>
+                <a:latin typeface="Segoe UI"/>
+              </a:rPr>
+              <a:t>vets-service</a:t>
+            </a:r>
+          </a:p>
+          <a:p>
+            <a:pPr algn="ctr" defTabSz="896386">
+              <a:defRPr/>
+            </a:pPr>
+            <a:r>
+              <a:rPr lang="en-US" sz="1765" b="1" kern="0" dirty="0">
+                <a:solidFill>
+                  <a:srgbClr val="FFFFFF"/>
+                </a:solidFill>
+                <a:latin typeface="Segoe UI"/>
+              </a:rPr>
+              <a:t>REST API</a:t>
+            </a:r>
+            <a:endParaRPr lang="en-US" sz="1765" kern="0" dirty="0">
+              <a:solidFill>
+                <a:srgbClr val="FFFFFF"/>
+              </a:solidFill>
+              <a:latin typeface="Segoe UI"/>
+            </a:endParaRPr>
+          </a:p>
+        </p:txBody>
+      </p:sp>
+      <p:sp>
+        <p:nvSpPr>
+          <p:cNvPr id="22" name="Rectangle 21">
+            <a:extLst>
+              <a:ext uri="{FF2B5EF4-FFF2-40B4-BE49-F238E27FC236}">
+                <a16:creationId xmlns:a16="http://schemas.microsoft.com/office/drawing/2014/main" id="{2AA8C0B1-849D-4BF2-888A-39E5ECB67723}"/>
+              </a:ext>
+            </a:extLst>
+          </p:cNvPr>
+          <p:cNvSpPr/>
+          <p:nvPr/>
+        </p:nvSpPr>
+        <p:spPr>
+          <a:xfrm>
+            <a:off x="8006456" y="4673941"/>
+            <a:ext cx="2229365" cy="776431"/>
+          </a:xfrm>
+          <a:prstGeom prst="rect">
+            <a:avLst/>
+          </a:prstGeom>
+          <a:solidFill>
+            <a:srgbClr val="4DB0FF"/>
+          </a:solidFill>
+          <a:ln w="6350" cap="flat" cmpd="sng" algn="ctr">
+            <a:noFill/>
+            <a:prstDash val="solid"/>
+            <a:miter lim="800000"/>
+          </a:ln>
+          <a:effectLst/>
+        </p:spPr>
+        <p:style>
+          <a:lnRef idx="0">
+            <a:scrgbClr r="0" g="0" b="0"/>
+          </a:lnRef>
+          <a:fillRef idx="0">
+            <a:scrgbClr r="0" g="0" b="0"/>
+          </a:fillRef>
+          <a:effectRef idx="0">
+            <a:scrgbClr r="0" g="0" b="0"/>
+          </a:effectRef>
+          <a:fontRef idx="major"/>
+        </p:style>
+        <p:txBody>
+          <a:bodyPr lIns="134464" tIns="134464" rtlCol="0" anchor="t" anchorCtr="0"/>
+          <a:lstStyle/>
+          <a:p>
+            <a:pPr algn="ctr" defTabSz="896386">
+              <a:defRPr/>
+            </a:pPr>
+            <a:r>
+              <a:rPr lang="en-US" sz="1765" b="1" kern="0" dirty="0">
+                <a:solidFill>
+                  <a:srgbClr val="FFFFFF"/>
+                </a:solidFill>
+                <a:latin typeface="Segoe UI"/>
+              </a:rPr>
+              <a:t>visits-service</a:t>
+            </a:r>
+          </a:p>
+          <a:p>
+            <a:pPr algn="ctr" defTabSz="896386">
+              <a:defRPr/>
+            </a:pPr>
+            <a:r>
+              <a:rPr lang="en-US" sz="1765" b="1" kern="0" dirty="0">
+                <a:solidFill>
+                  <a:srgbClr val="FFFFFF"/>
+                </a:solidFill>
+                <a:latin typeface="Segoe UI"/>
+              </a:rPr>
+              <a:t>REST API</a:t>
+            </a:r>
+            <a:endParaRPr lang="en-US" sz="1765" kern="0" dirty="0">
+              <a:solidFill>
+                <a:srgbClr val="FFFFFF"/>
+              </a:solidFill>
+              <a:latin typeface="Segoe UI"/>
+            </a:endParaRPr>
+          </a:p>
+        </p:txBody>
+      </p:sp>
+      <p:cxnSp>
+        <p:nvCxnSpPr>
+          <p:cNvPr id="28" name="Google Shape;1220;p51">
+            <a:extLst>
+              <a:ext uri="{FF2B5EF4-FFF2-40B4-BE49-F238E27FC236}">
+                <a16:creationId xmlns:a16="http://schemas.microsoft.com/office/drawing/2014/main" id="{D8C9CA71-6608-4F0E-924D-AB6889C42180}"/>
+              </a:ext>
+            </a:extLst>
+          </p:cNvPr>
+          <p:cNvCxnSpPr>
+            <a:cxnSpLocks/>
+            <a:stCxn id="147" idx="2"/>
+            <a:endCxn id="22" idx="0"/>
+          </p:cNvCxnSpPr>
+          <p:nvPr/>
+        </p:nvCxnSpPr>
+        <p:spPr>
+          <a:xfrm>
+            <a:off x="6095999" y="3439908"/>
+            <a:ext cx="3025140" cy="1234033"/>
+          </a:xfrm>
+          <a:prstGeom prst="straightConnector1">
+            <a:avLst/>
+          </a:prstGeom>
+          <a:noFill/>
+          <a:ln w="38100" cap="flat" cmpd="sng">
+            <a:solidFill>
+              <a:srgbClr val="00B050"/>
+            </a:solidFill>
+            <a:prstDash val="solid"/>
+            <a:round/>
+            <a:headEnd type="none" w="sm" len="sm"/>
+            <a:tailEnd type="triangle" w="sm" len="sm"/>
+          </a:ln>
+        </p:spPr>
+      </p:cxnSp>
+      <p:sp>
+        <p:nvSpPr>
+          <p:cNvPr id="33" name="Rectangle 32">
+            <a:extLst>
+              <a:ext uri="{FF2B5EF4-FFF2-40B4-BE49-F238E27FC236}">
+                <a16:creationId xmlns:a16="http://schemas.microsoft.com/office/drawing/2014/main" id="{3590184F-DBCF-437C-B868-D4B28F2AEE81}"/>
+              </a:ext>
+            </a:extLst>
+          </p:cNvPr>
+          <p:cNvSpPr/>
+          <p:nvPr/>
+        </p:nvSpPr>
+        <p:spPr>
+          <a:xfrm>
+            <a:off x="1956176" y="4681690"/>
+            <a:ext cx="2229365" cy="776431"/>
+          </a:xfrm>
+          <a:prstGeom prst="rect">
+            <a:avLst/>
+          </a:prstGeom>
+          <a:solidFill>
+            <a:srgbClr val="4DB0FF"/>
+          </a:solidFill>
+          <a:ln w="6350" cap="flat" cmpd="sng" algn="ctr">
+            <a:noFill/>
+            <a:prstDash val="solid"/>
+            <a:miter lim="800000"/>
+          </a:ln>
+          <a:effectLst/>
+        </p:spPr>
+        <p:style>
+          <a:lnRef idx="0">
+            <a:scrgbClr r="0" g="0" b="0"/>
+          </a:lnRef>
+          <a:fillRef idx="0">
+            <a:scrgbClr r="0" g="0" b="0"/>
+          </a:fillRef>
+          <a:effectRef idx="0">
+            <a:scrgbClr r="0" g="0" b="0"/>
+          </a:effectRef>
+          <a:fontRef idx="major"/>
+        </p:style>
+        <p:txBody>
+          <a:bodyPr lIns="134464" tIns="134464" rtlCol="0" anchor="t" anchorCtr="0"/>
+          <a:lstStyle/>
+          <a:p>
+            <a:pPr algn="ctr" defTabSz="896386">
+              <a:defRPr/>
+            </a:pPr>
+            <a:r>
+              <a:rPr lang="en-US" sz="1765" b="1" kern="0" dirty="0">
+                <a:solidFill>
+                  <a:srgbClr val="FFFFFF"/>
+                </a:solidFill>
+                <a:latin typeface="Segoe UI"/>
+              </a:rPr>
+              <a:t>customer-service</a:t>
+            </a:r>
+          </a:p>
+          <a:p>
+            <a:pPr algn="ctr" defTabSz="896386">
+              <a:defRPr/>
+            </a:pPr>
+            <a:r>
+              <a:rPr lang="en-US" sz="1765" b="1" kern="0" dirty="0">
+                <a:solidFill>
+                  <a:srgbClr val="FFFFFF"/>
+                </a:solidFill>
+                <a:latin typeface="Segoe UI"/>
+              </a:rPr>
+              <a:t>REST API</a:t>
+            </a:r>
+            <a:endParaRPr lang="en-US" sz="1765" kern="0" dirty="0">
+              <a:solidFill>
+                <a:srgbClr val="FFFFFF"/>
+              </a:solidFill>
+              <a:latin typeface="Segoe UI"/>
+            </a:endParaRPr>
+          </a:p>
+        </p:txBody>
+      </p:sp>
+      <p:cxnSp>
+        <p:nvCxnSpPr>
+          <p:cNvPr id="34" name="Google Shape;1220;p51">
+            <a:extLst>
+              <a:ext uri="{FF2B5EF4-FFF2-40B4-BE49-F238E27FC236}">
+                <a16:creationId xmlns:a16="http://schemas.microsoft.com/office/drawing/2014/main" id="{7C50031A-9047-4509-998C-C6E695E4646A}"/>
+              </a:ext>
+            </a:extLst>
+          </p:cNvPr>
+          <p:cNvCxnSpPr>
+            <a:cxnSpLocks/>
+            <a:stCxn id="147" idx="2"/>
+            <a:endCxn id="33" idx="0"/>
+          </p:cNvCxnSpPr>
+          <p:nvPr/>
+        </p:nvCxnSpPr>
+        <p:spPr>
+          <a:xfrm flipH="1">
+            <a:off x="3070859" y="3439908"/>
+            <a:ext cx="3025140" cy="1241782"/>
+          </a:xfrm>
+          <a:prstGeom prst="straightConnector1">
+            <a:avLst/>
+          </a:prstGeom>
+          <a:noFill/>
+          <a:ln w="38100" cap="flat" cmpd="sng">
+            <a:solidFill>
+              <a:srgbClr val="00B050"/>
+            </a:solidFill>
+            <a:prstDash val="solid"/>
+            <a:round/>
+            <a:headEnd type="none" w="sm" len="sm"/>
+            <a:tailEnd type="triangle" w="sm" len="sm"/>
+          </a:ln>
+        </p:spPr>
+      </p:cxnSp>
+      <p:pic>
+        <p:nvPicPr>
+          <p:cNvPr id="170" name="Image 67" descr="Une image contenant clipart&#10;&#10;Description générée avec un niveau de confiance très élevé">
+            <a:extLst>
+              <a:ext uri="{FF2B5EF4-FFF2-40B4-BE49-F238E27FC236}">
+                <a16:creationId xmlns:a16="http://schemas.microsoft.com/office/drawing/2014/main" id="{73FADB77-3BFC-4B5C-B659-0849333E47BD}"/>
+              </a:ext>
+            </a:extLst>
+          </p:cNvPr>
+          <p:cNvPicPr>
+            <a:picLocks noChangeAspect="1"/>
+          </p:cNvPicPr>
+          <p:nvPr/>
+        </p:nvPicPr>
+        <p:blipFill>
+          <a:blip r:embed="rId5" cstate="email">
+            <a:extLst>
+              <a:ext uri="{28A0092B-C50C-407E-A947-70E740481C1C}">
+                <a14:useLocalDpi xmlns:a14="http://schemas.microsoft.com/office/drawing/2010/main"/>
+              </a:ext>
+            </a:extLst>
+          </a:blip>
+          <a:stretch>
+            <a:fillRect/>
+          </a:stretch>
+        </p:blipFill>
+        <p:spPr>
+          <a:xfrm>
+            <a:off x="9106672" y="4346236"/>
+            <a:ext cx="359949" cy="322342"/>
+          </a:xfrm>
+          <a:prstGeom prst="rect">
+            <a:avLst/>
+          </a:prstGeom>
+        </p:spPr>
+      </p:pic>
+      <p:pic>
+        <p:nvPicPr>
+          <p:cNvPr id="171" name="Image 67" descr="Une image contenant clipart&#10;&#10;Description générée avec un niveau de confiance très élevé">
+            <a:extLst>
+              <a:ext uri="{FF2B5EF4-FFF2-40B4-BE49-F238E27FC236}">
+                <a16:creationId xmlns:a16="http://schemas.microsoft.com/office/drawing/2014/main" id="{81363C77-42A2-4EDC-AEEB-6B4CE30ED5C8}"/>
+              </a:ext>
+            </a:extLst>
+          </p:cNvPr>
+          <p:cNvPicPr>
+            <a:picLocks noChangeAspect="1"/>
+          </p:cNvPicPr>
+          <p:nvPr/>
+        </p:nvPicPr>
+        <p:blipFill>
+          <a:blip r:embed="rId5" cstate="email">
+            <a:extLst>
+              <a:ext uri="{28A0092B-C50C-407E-A947-70E740481C1C}">
+                <a14:useLocalDpi xmlns:a14="http://schemas.microsoft.com/office/drawing/2010/main"/>
+              </a:ext>
+            </a:extLst>
+          </a:blip>
+          <a:stretch>
+            <a:fillRect/>
+          </a:stretch>
+        </p:blipFill>
+        <p:spPr>
+          <a:xfrm>
+            <a:off x="6150660" y="4358994"/>
+            <a:ext cx="359949" cy="322342"/>
+          </a:xfrm>
+          <a:prstGeom prst="rect">
+            <a:avLst/>
+          </a:prstGeom>
+        </p:spPr>
+      </p:pic>
+      <p:pic>
+        <p:nvPicPr>
+          <p:cNvPr id="172" name="Image 67" descr="Une image contenant clipart&#10;&#10;Description générée avec un niveau de confiance très élevé">
+            <a:extLst>
+              <a:ext uri="{FF2B5EF4-FFF2-40B4-BE49-F238E27FC236}">
+                <a16:creationId xmlns:a16="http://schemas.microsoft.com/office/drawing/2014/main" id="{090A1B80-94FD-4EEF-BE0E-26FF476E3F9F}"/>
+              </a:ext>
+            </a:extLst>
+          </p:cNvPr>
+          <p:cNvPicPr>
+            <a:picLocks noChangeAspect="1"/>
+          </p:cNvPicPr>
+          <p:nvPr/>
+        </p:nvPicPr>
+        <p:blipFill>
+          <a:blip r:embed="rId5" cstate="email">
+            <a:extLst>
+              <a:ext uri="{28A0092B-C50C-407E-A947-70E740481C1C}">
+                <a14:useLocalDpi xmlns:a14="http://schemas.microsoft.com/office/drawing/2010/main"/>
+              </a:ext>
+            </a:extLst>
+          </a:blip>
+          <a:stretch>
+            <a:fillRect/>
+          </a:stretch>
+        </p:blipFill>
+        <p:spPr>
+          <a:xfrm>
+            <a:off x="2730829" y="4354138"/>
+            <a:ext cx="359949" cy="322342"/>
+          </a:xfrm>
+          <a:prstGeom prst="rect">
+            <a:avLst/>
+          </a:prstGeom>
+        </p:spPr>
+      </p:pic>
+      <p:pic>
+        <p:nvPicPr>
+          <p:cNvPr id="173" name="Image 67" descr="Une image contenant clipart&#10;&#10;Description générée avec un niveau de confiance très élevé">
+            <a:extLst>
+              <a:ext uri="{FF2B5EF4-FFF2-40B4-BE49-F238E27FC236}">
+                <a16:creationId xmlns:a16="http://schemas.microsoft.com/office/drawing/2014/main" id="{86523402-8A0C-4C5F-98F7-BB2F75914167}"/>
+              </a:ext>
+            </a:extLst>
+          </p:cNvPr>
+          <p:cNvPicPr>
+            <a:picLocks noChangeAspect="1"/>
+          </p:cNvPicPr>
+          <p:nvPr/>
+        </p:nvPicPr>
+        <p:blipFill>
+          <a:blip r:embed="rId5" cstate="email">
+            <a:extLst>
+              <a:ext uri="{28A0092B-C50C-407E-A947-70E740481C1C}">
+                <a14:useLocalDpi xmlns:a14="http://schemas.microsoft.com/office/drawing/2010/main"/>
+              </a:ext>
+            </a:extLst>
+          </a:blip>
+          <a:stretch>
+            <a:fillRect/>
+          </a:stretch>
+        </p:blipFill>
+        <p:spPr>
+          <a:xfrm>
+            <a:off x="5915268" y="2270890"/>
+            <a:ext cx="359949" cy="322342"/>
+          </a:xfrm>
+          <a:prstGeom prst="rect">
+            <a:avLst/>
+          </a:prstGeom>
+        </p:spPr>
+      </p:pic>
+      <p:cxnSp>
+        <p:nvCxnSpPr>
+          <p:cNvPr id="38" name="Google Shape;1220;p51">
+            <a:extLst>
+              <a:ext uri="{FF2B5EF4-FFF2-40B4-BE49-F238E27FC236}">
+                <a16:creationId xmlns:a16="http://schemas.microsoft.com/office/drawing/2014/main" id="{02F3A239-38FA-4017-AF20-6FD3414D4C83}"/>
+              </a:ext>
+            </a:extLst>
+          </p:cNvPr>
+          <p:cNvCxnSpPr>
+            <a:cxnSpLocks/>
+          </p:cNvCxnSpPr>
+          <p:nvPr/>
+        </p:nvCxnSpPr>
+        <p:spPr>
+          <a:xfrm flipH="1">
+            <a:off x="6278879" y="1267088"/>
+            <a:ext cx="4412" cy="1396389"/>
+          </a:xfrm>
+          <a:prstGeom prst="straightConnector1">
+            <a:avLst/>
+          </a:prstGeom>
+          <a:noFill/>
+          <a:ln w="38100" cap="flat" cmpd="sng">
+            <a:solidFill>
+              <a:srgbClr val="00B050"/>
+            </a:solidFill>
+            <a:prstDash val="solid"/>
+            <a:round/>
+            <a:headEnd type="none" w="sm" len="sm"/>
+            <a:tailEnd type="triangle" w="sm" len="sm"/>
+          </a:ln>
+        </p:spPr>
+      </p:cxnSp>
+      <p:cxnSp>
+        <p:nvCxnSpPr>
+          <p:cNvPr id="44" name="Google Shape;1220;p51">
+            <a:extLst>
+              <a:ext uri="{FF2B5EF4-FFF2-40B4-BE49-F238E27FC236}">
+                <a16:creationId xmlns:a16="http://schemas.microsoft.com/office/drawing/2014/main" id="{1EB3C14D-D440-4F69-B9F6-26C8707EF28F}"/>
+              </a:ext>
+            </a:extLst>
+          </p:cNvPr>
+          <p:cNvCxnSpPr>
+            <a:cxnSpLocks/>
+          </p:cNvCxnSpPr>
+          <p:nvPr/>
+        </p:nvCxnSpPr>
+        <p:spPr>
+          <a:xfrm flipH="1">
+            <a:off x="5920742" y="1274725"/>
+            <a:ext cx="4412" cy="1396389"/>
+          </a:xfrm>
+          <a:prstGeom prst="straightConnector1">
+            <a:avLst/>
+          </a:prstGeom>
+          <a:noFill/>
+          <a:ln w="38100" cap="flat" cmpd="sng">
+            <a:solidFill>
+              <a:srgbClr val="00B050"/>
+            </a:solidFill>
+            <a:prstDash val="solid"/>
+            <a:round/>
+            <a:headEnd type="none" w="sm" len="sm"/>
+            <a:tailEnd type="triangle" w="sm" len="sm"/>
+          </a:ln>
+        </p:spPr>
+      </p:cxnSp>
+      <p:sp>
+        <p:nvSpPr>
+          <p:cNvPr id="45" name="Google Shape;134;p16">
+            <a:extLst>
+              <a:ext uri="{FF2B5EF4-FFF2-40B4-BE49-F238E27FC236}">
+                <a16:creationId xmlns:a16="http://schemas.microsoft.com/office/drawing/2014/main" id="{13905C22-D6E6-4973-9223-30D4B376550C}"/>
+              </a:ext>
+            </a:extLst>
+          </p:cNvPr>
+          <p:cNvSpPr txBox="1"/>
+          <p:nvPr/>
+        </p:nvSpPr>
+        <p:spPr>
+          <a:xfrm>
+            <a:off x="6375372" y="1703562"/>
+            <a:ext cx="1136667" cy="296008"/>
+          </a:xfrm>
+          <a:prstGeom prst="rect">
+            <a:avLst/>
+          </a:prstGeom>
+          <a:noFill/>
+          <a:ln>
+            <a:noFill/>
+          </a:ln>
+        </p:spPr>
+        <p:txBody>
+          <a:bodyPr spcFirstLastPara="1" wrap="square" lIns="89628" tIns="44802" rIns="89628" bIns="44802" anchor="ctr" anchorCtr="0">
+            <a:noAutofit/>
+          </a:bodyPr>
+          <a:lstStyle/>
+          <a:p>
+            <a:pPr algn="ctr" defTabSz="914367">
+              <a:buClr>
+                <a:srgbClr val="000000"/>
+              </a:buClr>
+              <a:buSzPts val="800"/>
+            </a:pPr>
+            <a:r>
+              <a:rPr lang="en-GB" sz="1200" dirty="0">
+                <a:solidFill>
+                  <a:srgbClr val="000000"/>
+                </a:solidFill>
+                <a:latin typeface="Segoe UI"/>
+              </a:rPr>
+              <a:t>REST requests</a:t>
+            </a:r>
+            <a:endParaRPr sz="1200" dirty="0">
+              <a:solidFill>
+                <a:srgbClr val="000000"/>
+              </a:solidFill>
+              <a:latin typeface="Segoe UI"/>
+            </a:endParaRPr>
+          </a:p>
+        </p:txBody>
+      </p:sp>
+      <p:sp>
+        <p:nvSpPr>
+          <p:cNvPr id="46" name="Google Shape;134;p16">
+            <a:extLst>
+              <a:ext uri="{FF2B5EF4-FFF2-40B4-BE49-F238E27FC236}">
+                <a16:creationId xmlns:a16="http://schemas.microsoft.com/office/drawing/2014/main" id="{B32028B2-13DA-4D85-A0DD-6D32BD20FDA4}"/>
+              </a:ext>
+            </a:extLst>
+          </p:cNvPr>
+          <p:cNvSpPr txBox="1"/>
+          <p:nvPr/>
+        </p:nvSpPr>
+        <p:spPr>
+          <a:xfrm>
+            <a:off x="4635216" y="1698257"/>
+            <a:ext cx="1279156" cy="296008"/>
+          </a:xfrm>
+          <a:prstGeom prst="rect">
+            <a:avLst/>
+          </a:prstGeom>
+          <a:noFill/>
+          <a:ln>
+            <a:noFill/>
+          </a:ln>
+        </p:spPr>
+        <p:txBody>
+          <a:bodyPr spcFirstLastPara="1" wrap="square" lIns="89628" tIns="44802" rIns="89628" bIns="44802" anchor="ctr" anchorCtr="0">
+            <a:noAutofit/>
+          </a:bodyPr>
+          <a:lstStyle/>
+          <a:p>
+            <a:pPr algn="ctr" defTabSz="914367">
+              <a:buClr>
+                <a:srgbClr val="000000"/>
+              </a:buClr>
+              <a:buSzPts val="800"/>
+            </a:pPr>
+            <a:r>
+              <a:rPr lang="en-GB" sz="1200" dirty="0">
+                <a:solidFill>
+                  <a:srgbClr val="000000"/>
+                </a:solidFill>
+                <a:latin typeface="Segoe UI"/>
+              </a:rPr>
+              <a:t>Static resources</a:t>
+            </a:r>
+            <a:endParaRPr sz="1200" dirty="0">
+              <a:solidFill>
+                <a:srgbClr val="000000"/>
+              </a:solidFill>
+              <a:latin typeface="Segoe UI"/>
+            </a:endParaRPr>
+          </a:p>
+        </p:txBody>
+      </p:sp>
+      <p:pic>
+        <p:nvPicPr>
+          <p:cNvPr id="8" name="Graphic 7">
+            <a:extLst>
+              <a:ext uri="{FF2B5EF4-FFF2-40B4-BE49-F238E27FC236}">
+                <a16:creationId xmlns:a16="http://schemas.microsoft.com/office/drawing/2014/main" id="{86E1258B-66C7-486A-99F6-8DE53F75982C}"/>
+              </a:ext>
+            </a:extLst>
+          </p:cNvPr>
+          <p:cNvPicPr>
+            <a:picLocks noChangeAspect="1"/>
+          </p:cNvPicPr>
+          <p:nvPr/>
+        </p:nvPicPr>
+        <p:blipFill>
+          <a:blip r:embed="rId6">
+            <a:extLst>
+              <a:ext uri="{28A0092B-C50C-407E-A947-70E740481C1C}">
+                <a14:useLocalDpi xmlns:a14="http://schemas.microsoft.com/office/drawing/2010/main" val="0"/>
+              </a:ext>
+              <a:ext uri="{96DAC541-7B7A-43D3-8B79-37D633B846F1}">
+                <asvg:svgBlip xmlns:asvg="http://schemas.microsoft.com/office/drawing/2016/SVG/main" r:embed="rId7"/>
+              </a:ext>
+            </a:extLst>
+          </a:blip>
+          <a:stretch>
+            <a:fillRect/>
+          </a:stretch>
+        </p:blipFill>
+        <p:spPr>
+          <a:xfrm>
+            <a:off x="2611269" y="5618728"/>
+            <a:ext cx="599067" cy="599067"/>
+          </a:xfrm>
+          <a:prstGeom prst="rect">
+            <a:avLst/>
+          </a:prstGeom>
+        </p:spPr>
+      </p:pic>
+      <p:pic>
+        <p:nvPicPr>
+          <p:cNvPr id="9" name="Graphic 8">
+            <a:extLst>
+              <a:ext uri="{FF2B5EF4-FFF2-40B4-BE49-F238E27FC236}">
+                <a16:creationId xmlns:a16="http://schemas.microsoft.com/office/drawing/2014/main" id="{681ED6AD-CCA1-4F06-9D19-89C4705DB81B}"/>
+              </a:ext>
+            </a:extLst>
+          </p:cNvPr>
+          <p:cNvPicPr>
+            <a:picLocks noChangeAspect="1"/>
+          </p:cNvPicPr>
+          <p:nvPr/>
+        </p:nvPicPr>
+        <p:blipFill>
+          <a:blip r:embed="rId6">
+            <a:extLst>
+              <a:ext uri="{28A0092B-C50C-407E-A947-70E740481C1C}">
+                <a14:useLocalDpi xmlns:a14="http://schemas.microsoft.com/office/drawing/2010/main" val="0"/>
+              </a:ext>
+              <a:ext uri="{96DAC541-7B7A-43D3-8B79-37D633B846F1}">
+                <asvg:svgBlip xmlns:asvg="http://schemas.microsoft.com/office/drawing/2016/SVG/main" r:embed="rId7"/>
+              </a:ext>
+            </a:extLst>
+          </a:blip>
+          <a:stretch>
+            <a:fillRect/>
+          </a:stretch>
+        </p:blipFill>
+        <p:spPr>
+          <a:xfrm>
+            <a:off x="5795708" y="5620964"/>
+            <a:ext cx="599067" cy="599067"/>
+          </a:xfrm>
+          <a:prstGeom prst="rect">
+            <a:avLst/>
+          </a:prstGeom>
+        </p:spPr>
+      </p:pic>
+      <p:pic>
+        <p:nvPicPr>
+          <p:cNvPr id="10" name="Graphic 9">
+            <a:extLst>
+              <a:ext uri="{FF2B5EF4-FFF2-40B4-BE49-F238E27FC236}">
+                <a16:creationId xmlns:a16="http://schemas.microsoft.com/office/drawing/2014/main" id="{EF64557F-BE1F-419E-8FE2-B5C97996CAD3}"/>
+              </a:ext>
+            </a:extLst>
+          </p:cNvPr>
+          <p:cNvPicPr>
+            <a:picLocks noChangeAspect="1"/>
+          </p:cNvPicPr>
+          <p:nvPr/>
+        </p:nvPicPr>
+        <p:blipFill>
+          <a:blip r:embed="rId6">
+            <a:extLst>
+              <a:ext uri="{28A0092B-C50C-407E-A947-70E740481C1C}">
+                <a14:useLocalDpi xmlns:a14="http://schemas.microsoft.com/office/drawing/2010/main" val="0"/>
+              </a:ext>
+              <a:ext uri="{96DAC541-7B7A-43D3-8B79-37D633B846F1}">
+                <asvg:svgBlip xmlns:asvg="http://schemas.microsoft.com/office/drawing/2016/SVG/main" r:embed="rId7"/>
+              </a:ext>
+            </a:extLst>
+          </a:blip>
+          <a:stretch>
+            <a:fillRect/>
+          </a:stretch>
+        </p:blipFill>
+        <p:spPr>
+          <a:xfrm>
+            <a:off x="8821604" y="5618728"/>
+            <a:ext cx="599067" cy="599067"/>
+          </a:xfrm>
+          <a:prstGeom prst="rect">
+            <a:avLst/>
+          </a:prstGeom>
+        </p:spPr>
+      </p:pic>
+      <p:sp>
+        <p:nvSpPr>
+          <p:cNvPr id="11" name="Google Shape;87;p16">
+            <a:extLst>
+              <a:ext uri="{FF2B5EF4-FFF2-40B4-BE49-F238E27FC236}">
+                <a16:creationId xmlns:a16="http://schemas.microsoft.com/office/drawing/2014/main" id="{AD18CF54-DC24-4392-9920-6CA596D6A128}"/>
+              </a:ext>
+            </a:extLst>
+          </p:cNvPr>
+          <p:cNvSpPr txBox="1"/>
+          <p:nvPr/>
+        </p:nvSpPr>
+        <p:spPr>
+          <a:xfrm>
+            <a:off x="2081610" y="6283758"/>
+            <a:ext cx="1658383" cy="189288"/>
+          </a:xfrm>
+          <a:prstGeom prst="rect">
+            <a:avLst/>
+          </a:prstGeom>
+          <a:noFill/>
+          <a:ln>
+            <a:noFill/>
+          </a:ln>
+        </p:spPr>
+        <p:txBody>
+          <a:bodyPr spcFirstLastPara="1" wrap="square" lIns="89628" tIns="44802" rIns="89628" bIns="44802" anchor="ctr" anchorCtr="0">
+            <a:noAutofit/>
+          </a:bodyPr>
+          <a:lstStyle/>
+          <a:p>
+            <a:pPr algn="ctr" defTabSz="914367">
+              <a:buClr>
+                <a:srgbClr val="000000"/>
+              </a:buClr>
+              <a:buSzPts val="800"/>
+            </a:pPr>
+            <a:r>
+              <a:rPr lang="en-GB" sz="1200" dirty="0">
+                <a:solidFill>
+                  <a:srgbClr val="000000"/>
+                </a:solidFill>
+                <a:latin typeface="Segoe UI"/>
+              </a:rPr>
+              <a:t>Azure DB for MySQL </a:t>
+            </a:r>
+            <a:endParaRPr sz="1200" dirty="0">
+              <a:solidFill>
+                <a:srgbClr val="000000"/>
+              </a:solidFill>
+              <a:latin typeface="Segoe UI"/>
+            </a:endParaRPr>
+          </a:p>
+        </p:txBody>
+      </p:sp>
+      <p:sp>
+        <p:nvSpPr>
+          <p:cNvPr id="12" name="Google Shape;87;p16">
+            <a:extLst>
+              <a:ext uri="{FF2B5EF4-FFF2-40B4-BE49-F238E27FC236}">
+                <a16:creationId xmlns:a16="http://schemas.microsoft.com/office/drawing/2014/main" id="{FE3F05BA-E348-4D46-90FB-2F1AA771E7A4}"/>
+              </a:ext>
+            </a:extLst>
+          </p:cNvPr>
+          <p:cNvSpPr txBox="1"/>
+          <p:nvPr/>
+        </p:nvSpPr>
+        <p:spPr>
+          <a:xfrm>
+            <a:off x="5266049" y="6321552"/>
+            <a:ext cx="1658383" cy="189288"/>
+          </a:xfrm>
+          <a:prstGeom prst="rect">
+            <a:avLst/>
+          </a:prstGeom>
+          <a:noFill/>
+          <a:ln>
+            <a:noFill/>
+          </a:ln>
+        </p:spPr>
+        <p:txBody>
+          <a:bodyPr spcFirstLastPara="1" wrap="square" lIns="89628" tIns="44802" rIns="89628" bIns="44802" anchor="ctr" anchorCtr="0">
+            <a:noAutofit/>
+          </a:bodyPr>
+          <a:lstStyle/>
+          <a:p>
+            <a:pPr algn="ctr" defTabSz="914367">
+              <a:buClr>
+                <a:srgbClr val="000000"/>
+              </a:buClr>
+              <a:buSzPts val="800"/>
+            </a:pPr>
+            <a:r>
+              <a:rPr lang="en-GB" sz="1200" dirty="0">
+                <a:solidFill>
+                  <a:srgbClr val="000000"/>
+                </a:solidFill>
+                <a:latin typeface="Segoe UI"/>
+              </a:rPr>
+              <a:t>Azure DB for MySQL </a:t>
+            </a:r>
+            <a:endParaRPr sz="1200" dirty="0">
+              <a:solidFill>
+                <a:srgbClr val="000000"/>
+              </a:solidFill>
+              <a:latin typeface="Segoe UI"/>
+            </a:endParaRPr>
+          </a:p>
+        </p:txBody>
+      </p:sp>
+      <p:sp>
+        <p:nvSpPr>
+          <p:cNvPr id="13" name="Google Shape;87;p16">
+            <a:extLst>
+              <a:ext uri="{FF2B5EF4-FFF2-40B4-BE49-F238E27FC236}">
+                <a16:creationId xmlns:a16="http://schemas.microsoft.com/office/drawing/2014/main" id="{5377A6F2-F07C-4ED1-837F-393CE8287A54}"/>
+              </a:ext>
+            </a:extLst>
+          </p:cNvPr>
+          <p:cNvSpPr txBox="1"/>
+          <p:nvPr/>
+        </p:nvSpPr>
+        <p:spPr>
+          <a:xfrm>
+            <a:off x="8277480" y="6283758"/>
+            <a:ext cx="1658383" cy="189288"/>
+          </a:xfrm>
+          <a:prstGeom prst="rect">
+            <a:avLst/>
+          </a:prstGeom>
+          <a:noFill/>
+          <a:ln>
+            <a:noFill/>
+          </a:ln>
+        </p:spPr>
+        <p:txBody>
+          <a:bodyPr spcFirstLastPara="1" wrap="square" lIns="89628" tIns="44802" rIns="89628" bIns="44802" anchor="ctr" anchorCtr="0">
+            <a:noAutofit/>
+          </a:bodyPr>
+          <a:lstStyle/>
+          <a:p>
+            <a:pPr algn="ctr" defTabSz="914367">
+              <a:buClr>
+                <a:srgbClr val="000000"/>
+              </a:buClr>
+              <a:buSzPts val="800"/>
+            </a:pPr>
+            <a:r>
+              <a:rPr lang="en-GB" sz="1200" dirty="0">
+                <a:solidFill>
+                  <a:srgbClr val="000000"/>
+                </a:solidFill>
+                <a:latin typeface="Segoe UI"/>
+              </a:rPr>
+              <a:t>Azure DB for MySQL </a:t>
+            </a:r>
+            <a:endParaRPr sz="1200" dirty="0">
+              <a:solidFill>
+                <a:srgbClr val="000000"/>
+              </a:solidFill>
+              <a:latin typeface="Segoe UI"/>
+            </a:endParaRPr>
+          </a:p>
+        </p:txBody>
+      </p:sp>
+    </p:spTree>
+    <p:extLst>
+      <p:ext uri="{BB962C8B-B14F-4D97-AF65-F5344CB8AC3E}">
+        <p14:creationId xmlns:p14="http://schemas.microsoft.com/office/powerpoint/2010/main" val="2695559754"/>
+      </p:ext>
+    </p:extLst>
+  </p:cSld>
+  <p:clrMapOvr>
+    <a:masterClrMapping/>
+  </p:clrMapOvr>
+  <p:transition>
+    <p:fade/>
+  </p:transition>
+</p:sld>
+</file>
+
+<file path=ppt/slides/slide2.xml><?xml version="1.0" encoding="utf-8"?>
+<p:sld xmlns:a="http://schemas.openxmlformats.org/drawingml/2006/main" xmlns:r="http://schemas.openxmlformats.org/officeDocument/2006/relationships" xmlns:p="http://schemas.openxmlformats.org/presentationml/2006/main">
+  <p:cSld>
+    <p:spTree>
+      <p:nvGrpSpPr>
+        <p:cNvPr id="1" name=""/>
+        <p:cNvGrpSpPr/>
+        <p:nvPr/>
+      </p:nvGrpSpPr>
+      <p:grpSpPr>
+        <a:xfrm>
+          <a:off x="0" y="0"/>
+          <a:ext cx="0" cy="0"/>
+          <a:chOff x="0" y="0"/>
+          <a:chExt cx="0" cy="0"/>
+        </a:xfrm>
+      </p:grpSpPr>
+      <p:sp>
+        <p:nvSpPr>
           <p:cNvPr id="147" name="Rectangle 146">
             <a:extLst>
               <a:ext uri="{FF2B5EF4-FFF2-40B4-BE49-F238E27FC236}">
@@ -19375,7 +20947,7 @@
     </p:spTree>
     <p:extLst>
       <p:ext uri="{BB962C8B-B14F-4D97-AF65-F5344CB8AC3E}">
-        <p14:creationId xmlns:p14="http://schemas.microsoft.com/office/powerpoint/2010/main" val="2695559754"/>
+        <p14:creationId xmlns:p14="http://schemas.microsoft.com/office/powerpoint/2010/main" val="4192843328"/>
       </p:ext>
     </p:extLst>
   </p:cSld>

</xml_diff>